<commit_message>
add reviewer s by prob
</commit_message>
<xml_diff>
--- a/report.pptx
+++ b/report.pptx
@@ -5,10 +5,7 @@
     <p:sldMasterId id="2147483648" r:id="rId1"/>
   </p:sldMasterIdLst>
   <p:sldIdLst>
-    <p:sldId id="257" r:id="rId2"/>
-    <p:sldId id="258" r:id="rId3"/>
-    <p:sldId id="259" r:id="rId4"/>
-    <p:sldId id="260" r:id="rId5"/>
+    <p:sldId id="256" r:id="rId2"/>
   </p:sldIdLst>
   <p:sldSz cx="9144000" cy="6858000" type="screen4x3"/>
   <p:notesSz cx="6858000" cy="9144000"/>
@@ -289,9 +286,9 @@
           <a:bodyPr/>
           <a:lstStyle/>
           <a:p>
-            <a:fld id="{200C512D-3136-1144-BFF5-3CA45E2FA6FC}" type="datetimeFigureOut">
-              <a:rPr kumimoji="1" lang="zh-CN" altLang="en-US" smtClean="0"/>
-              <a:t>11/10/15</a:t>
+            <a:fld id="{2216C449-C998-D24C-B1B5-27E4F76912D7}" type="datetimeFigureOut">
+              <a:rPr kumimoji="1" lang="zh-CN" altLang="en-US" smtClean="0"/>
+              <a:t>11/18/15</a:t>
             </a:fld>
             <a:endParaRPr kumimoji="1" lang="zh-CN" altLang="en-US"/>
           </a:p>
@@ -331,7 +328,7 @@
           <a:bodyPr/>
           <a:lstStyle/>
           <a:p>
-            <a:fld id="{DB851F3C-F00A-884D-AB2A-498327A1581F}" type="slidenum">
+            <a:fld id="{C1B45B73-84AC-FB49-8F2B-27810A872929}" type="slidenum">
               <a:rPr kumimoji="1" lang="zh-CN" altLang="en-US" smtClean="0"/>
               <a:t>‹#›</a:t>
             </a:fld>
@@ -342,7 +339,7 @@
     </p:spTree>
     <p:extLst>
       <p:ext uri="{BB962C8B-B14F-4D97-AF65-F5344CB8AC3E}">
-        <p14:creationId xmlns:p14="http://schemas.microsoft.com/office/powerpoint/2010/main" val="651178253"/>
+        <p14:creationId xmlns:p14="http://schemas.microsoft.com/office/powerpoint/2010/main" val="2220314391"/>
       </p:ext>
     </p:extLst>
   </p:cSld>
@@ -459,9 +456,9 @@
           <a:bodyPr/>
           <a:lstStyle/>
           <a:p>
-            <a:fld id="{200C512D-3136-1144-BFF5-3CA45E2FA6FC}" type="datetimeFigureOut">
-              <a:rPr kumimoji="1" lang="zh-CN" altLang="en-US" smtClean="0"/>
-              <a:t>11/10/15</a:t>
+            <a:fld id="{2216C449-C998-D24C-B1B5-27E4F76912D7}" type="datetimeFigureOut">
+              <a:rPr kumimoji="1" lang="zh-CN" altLang="en-US" smtClean="0"/>
+              <a:t>11/18/15</a:t>
             </a:fld>
             <a:endParaRPr kumimoji="1" lang="zh-CN" altLang="en-US"/>
           </a:p>
@@ -501,7 +498,7 @@
           <a:bodyPr/>
           <a:lstStyle/>
           <a:p>
-            <a:fld id="{DB851F3C-F00A-884D-AB2A-498327A1581F}" type="slidenum">
+            <a:fld id="{C1B45B73-84AC-FB49-8F2B-27810A872929}" type="slidenum">
               <a:rPr kumimoji="1" lang="zh-CN" altLang="en-US" smtClean="0"/>
               <a:t>‹#›</a:t>
             </a:fld>
@@ -512,7 +509,7 @@
     </p:spTree>
     <p:extLst>
       <p:ext uri="{BB962C8B-B14F-4D97-AF65-F5344CB8AC3E}">
-        <p14:creationId xmlns:p14="http://schemas.microsoft.com/office/powerpoint/2010/main" val="2695001150"/>
+        <p14:creationId xmlns:p14="http://schemas.microsoft.com/office/powerpoint/2010/main" val="1741372587"/>
       </p:ext>
     </p:extLst>
   </p:cSld>
@@ -639,9 +636,9 @@
           <a:bodyPr/>
           <a:lstStyle/>
           <a:p>
-            <a:fld id="{200C512D-3136-1144-BFF5-3CA45E2FA6FC}" type="datetimeFigureOut">
-              <a:rPr kumimoji="1" lang="zh-CN" altLang="en-US" smtClean="0"/>
-              <a:t>11/10/15</a:t>
+            <a:fld id="{2216C449-C998-D24C-B1B5-27E4F76912D7}" type="datetimeFigureOut">
+              <a:rPr kumimoji="1" lang="zh-CN" altLang="en-US" smtClean="0"/>
+              <a:t>11/18/15</a:t>
             </a:fld>
             <a:endParaRPr kumimoji="1" lang="zh-CN" altLang="en-US"/>
           </a:p>
@@ -681,7 +678,7 @@
           <a:bodyPr/>
           <a:lstStyle/>
           <a:p>
-            <a:fld id="{DB851F3C-F00A-884D-AB2A-498327A1581F}" type="slidenum">
+            <a:fld id="{C1B45B73-84AC-FB49-8F2B-27810A872929}" type="slidenum">
               <a:rPr kumimoji="1" lang="zh-CN" altLang="en-US" smtClean="0"/>
               <a:t>‹#›</a:t>
             </a:fld>
@@ -692,7 +689,7 @@
     </p:spTree>
     <p:extLst>
       <p:ext uri="{BB962C8B-B14F-4D97-AF65-F5344CB8AC3E}">
-        <p14:creationId xmlns:p14="http://schemas.microsoft.com/office/powerpoint/2010/main" val="4020012721"/>
+        <p14:creationId xmlns:p14="http://schemas.microsoft.com/office/powerpoint/2010/main" val="2351479656"/>
       </p:ext>
     </p:extLst>
   </p:cSld>
@@ -809,9 +806,9 @@
           <a:bodyPr/>
           <a:lstStyle/>
           <a:p>
-            <a:fld id="{200C512D-3136-1144-BFF5-3CA45E2FA6FC}" type="datetimeFigureOut">
-              <a:rPr kumimoji="1" lang="zh-CN" altLang="en-US" smtClean="0"/>
-              <a:t>11/10/15</a:t>
+            <a:fld id="{2216C449-C998-D24C-B1B5-27E4F76912D7}" type="datetimeFigureOut">
+              <a:rPr kumimoji="1" lang="zh-CN" altLang="en-US" smtClean="0"/>
+              <a:t>11/18/15</a:t>
             </a:fld>
             <a:endParaRPr kumimoji="1" lang="zh-CN" altLang="en-US"/>
           </a:p>
@@ -851,7 +848,7 @@
           <a:bodyPr/>
           <a:lstStyle/>
           <a:p>
-            <a:fld id="{DB851F3C-F00A-884D-AB2A-498327A1581F}" type="slidenum">
+            <a:fld id="{C1B45B73-84AC-FB49-8F2B-27810A872929}" type="slidenum">
               <a:rPr kumimoji="1" lang="zh-CN" altLang="en-US" smtClean="0"/>
               <a:t>‹#›</a:t>
             </a:fld>
@@ -862,7 +859,7 @@
     </p:spTree>
     <p:extLst>
       <p:ext uri="{BB962C8B-B14F-4D97-AF65-F5344CB8AC3E}">
-        <p14:creationId xmlns:p14="http://schemas.microsoft.com/office/powerpoint/2010/main" val="2653909589"/>
+        <p14:creationId xmlns:p14="http://schemas.microsoft.com/office/powerpoint/2010/main" val="4036953910"/>
       </p:ext>
     </p:extLst>
   </p:cSld>
@@ -1055,9 +1052,9 @@
           <a:bodyPr/>
           <a:lstStyle/>
           <a:p>
-            <a:fld id="{200C512D-3136-1144-BFF5-3CA45E2FA6FC}" type="datetimeFigureOut">
-              <a:rPr kumimoji="1" lang="zh-CN" altLang="en-US" smtClean="0"/>
-              <a:t>11/10/15</a:t>
+            <a:fld id="{2216C449-C998-D24C-B1B5-27E4F76912D7}" type="datetimeFigureOut">
+              <a:rPr kumimoji="1" lang="zh-CN" altLang="en-US" smtClean="0"/>
+              <a:t>11/18/15</a:t>
             </a:fld>
             <a:endParaRPr kumimoji="1" lang="zh-CN" altLang="en-US"/>
           </a:p>
@@ -1097,7 +1094,7 @@
           <a:bodyPr/>
           <a:lstStyle/>
           <a:p>
-            <a:fld id="{DB851F3C-F00A-884D-AB2A-498327A1581F}" type="slidenum">
+            <a:fld id="{C1B45B73-84AC-FB49-8F2B-27810A872929}" type="slidenum">
               <a:rPr kumimoji="1" lang="zh-CN" altLang="en-US" smtClean="0"/>
               <a:t>‹#›</a:t>
             </a:fld>
@@ -1108,7 +1105,7 @@
     </p:spTree>
     <p:extLst>
       <p:ext uri="{BB962C8B-B14F-4D97-AF65-F5344CB8AC3E}">
-        <p14:creationId xmlns:p14="http://schemas.microsoft.com/office/powerpoint/2010/main" val="428871239"/>
+        <p14:creationId xmlns:p14="http://schemas.microsoft.com/office/powerpoint/2010/main" val="3197398605"/>
       </p:ext>
     </p:extLst>
   </p:cSld>
@@ -1343,9 +1340,9 @@
           <a:bodyPr/>
           <a:lstStyle/>
           <a:p>
-            <a:fld id="{200C512D-3136-1144-BFF5-3CA45E2FA6FC}" type="datetimeFigureOut">
-              <a:rPr kumimoji="1" lang="zh-CN" altLang="en-US" smtClean="0"/>
-              <a:t>11/10/15</a:t>
+            <a:fld id="{2216C449-C998-D24C-B1B5-27E4F76912D7}" type="datetimeFigureOut">
+              <a:rPr kumimoji="1" lang="zh-CN" altLang="en-US" smtClean="0"/>
+              <a:t>11/18/15</a:t>
             </a:fld>
             <a:endParaRPr kumimoji="1" lang="zh-CN" altLang="en-US"/>
           </a:p>
@@ -1385,7 +1382,7 @@
           <a:bodyPr/>
           <a:lstStyle/>
           <a:p>
-            <a:fld id="{DB851F3C-F00A-884D-AB2A-498327A1581F}" type="slidenum">
+            <a:fld id="{C1B45B73-84AC-FB49-8F2B-27810A872929}" type="slidenum">
               <a:rPr kumimoji="1" lang="zh-CN" altLang="en-US" smtClean="0"/>
               <a:t>‹#›</a:t>
             </a:fld>
@@ -1396,7 +1393,7 @@
     </p:spTree>
     <p:extLst>
       <p:ext uri="{BB962C8B-B14F-4D97-AF65-F5344CB8AC3E}">
-        <p14:creationId xmlns:p14="http://schemas.microsoft.com/office/powerpoint/2010/main" val="3200303024"/>
+        <p14:creationId xmlns:p14="http://schemas.microsoft.com/office/powerpoint/2010/main" val="3049422205"/>
       </p:ext>
     </p:extLst>
   </p:cSld>
@@ -1765,9 +1762,9 @@
           <a:bodyPr/>
           <a:lstStyle/>
           <a:p>
-            <a:fld id="{200C512D-3136-1144-BFF5-3CA45E2FA6FC}" type="datetimeFigureOut">
-              <a:rPr kumimoji="1" lang="zh-CN" altLang="en-US" smtClean="0"/>
-              <a:t>11/10/15</a:t>
+            <a:fld id="{2216C449-C998-D24C-B1B5-27E4F76912D7}" type="datetimeFigureOut">
+              <a:rPr kumimoji="1" lang="zh-CN" altLang="en-US" smtClean="0"/>
+              <a:t>11/18/15</a:t>
             </a:fld>
             <a:endParaRPr kumimoji="1" lang="zh-CN" altLang="en-US"/>
           </a:p>
@@ -1807,7 +1804,7 @@
           <a:bodyPr/>
           <a:lstStyle/>
           <a:p>
-            <a:fld id="{DB851F3C-F00A-884D-AB2A-498327A1581F}" type="slidenum">
+            <a:fld id="{C1B45B73-84AC-FB49-8F2B-27810A872929}" type="slidenum">
               <a:rPr kumimoji="1" lang="zh-CN" altLang="en-US" smtClean="0"/>
               <a:t>‹#›</a:t>
             </a:fld>
@@ -1818,7 +1815,7 @@
     </p:spTree>
     <p:extLst>
       <p:ext uri="{BB962C8B-B14F-4D97-AF65-F5344CB8AC3E}">
-        <p14:creationId xmlns:p14="http://schemas.microsoft.com/office/powerpoint/2010/main" val="1620589389"/>
+        <p14:creationId xmlns:p14="http://schemas.microsoft.com/office/powerpoint/2010/main" val="4150027811"/>
       </p:ext>
     </p:extLst>
   </p:cSld>
@@ -1883,9 +1880,9 @@
           <a:bodyPr/>
           <a:lstStyle/>
           <a:p>
-            <a:fld id="{200C512D-3136-1144-BFF5-3CA45E2FA6FC}" type="datetimeFigureOut">
-              <a:rPr kumimoji="1" lang="zh-CN" altLang="en-US" smtClean="0"/>
-              <a:t>11/10/15</a:t>
+            <a:fld id="{2216C449-C998-D24C-B1B5-27E4F76912D7}" type="datetimeFigureOut">
+              <a:rPr kumimoji="1" lang="zh-CN" altLang="en-US" smtClean="0"/>
+              <a:t>11/18/15</a:t>
             </a:fld>
             <a:endParaRPr kumimoji="1" lang="zh-CN" altLang="en-US"/>
           </a:p>
@@ -1925,7 +1922,7 @@
           <a:bodyPr/>
           <a:lstStyle/>
           <a:p>
-            <a:fld id="{DB851F3C-F00A-884D-AB2A-498327A1581F}" type="slidenum">
+            <a:fld id="{C1B45B73-84AC-FB49-8F2B-27810A872929}" type="slidenum">
               <a:rPr kumimoji="1" lang="zh-CN" altLang="en-US" smtClean="0"/>
               <a:t>‹#›</a:t>
             </a:fld>
@@ -1936,7 +1933,7 @@
     </p:spTree>
     <p:extLst>
       <p:ext uri="{BB962C8B-B14F-4D97-AF65-F5344CB8AC3E}">
-        <p14:creationId xmlns:p14="http://schemas.microsoft.com/office/powerpoint/2010/main" val="1725981815"/>
+        <p14:creationId xmlns:p14="http://schemas.microsoft.com/office/powerpoint/2010/main" val="3537081055"/>
       </p:ext>
     </p:extLst>
   </p:cSld>
@@ -1978,9 +1975,9 @@
           <a:bodyPr/>
           <a:lstStyle/>
           <a:p>
-            <a:fld id="{200C512D-3136-1144-BFF5-3CA45E2FA6FC}" type="datetimeFigureOut">
-              <a:rPr kumimoji="1" lang="zh-CN" altLang="en-US" smtClean="0"/>
-              <a:t>11/10/15</a:t>
+            <a:fld id="{2216C449-C998-D24C-B1B5-27E4F76912D7}" type="datetimeFigureOut">
+              <a:rPr kumimoji="1" lang="zh-CN" altLang="en-US" smtClean="0"/>
+              <a:t>11/18/15</a:t>
             </a:fld>
             <a:endParaRPr kumimoji="1" lang="zh-CN" altLang="en-US"/>
           </a:p>
@@ -2020,7 +2017,7 @@
           <a:bodyPr/>
           <a:lstStyle/>
           <a:p>
-            <a:fld id="{DB851F3C-F00A-884D-AB2A-498327A1581F}" type="slidenum">
+            <a:fld id="{C1B45B73-84AC-FB49-8F2B-27810A872929}" type="slidenum">
               <a:rPr kumimoji="1" lang="zh-CN" altLang="en-US" smtClean="0"/>
               <a:t>‹#›</a:t>
             </a:fld>
@@ -2031,7 +2028,7 @@
     </p:spTree>
     <p:extLst>
       <p:ext uri="{BB962C8B-B14F-4D97-AF65-F5344CB8AC3E}">
-        <p14:creationId xmlns:p14="http://schemas.microsoft.com/office/powerpoint/2010/main" val="2010109147"/>
+        <p14:creationId xmlns:p14="http://schemas.microsoft.com/office/powerpoint/2010/main" val="2909503259"/>
       </p:ext>
     </p:extLst>
   </p:cSld>
@@ -2255,9 +2252,9 @@
           <a:bodyPr/>
           <a:lstStyle/>
           <a:p>
-            <a:fld id="{200C512D-3136-1144-BFF5-3CA45E2FA6FC}" type="datetimeFigureOut">
-              <a:rPr kumimoji="1" lang="zh-CN" altLang="en-US" smtClean="0"/>
-              <a:t>11/10/15</a:t>
+            <a:fld id="{2216C449-C998-D24C-B1B5-27E4F76912D7}" type="datetimeFigureOut">
+              <a:rPr kumimoji="1" lang="zh-CN" altLang="en-US" smtClean="0"/>
+              <a:t>11/18/15</a:t>
             </a:fld>
             <a:endParaRPr kumimoji="1" lang="zh-CN" altLang="en-US"/>
           </a:p>
@@ -2297,7 +2294,7 @@
           <a:bodyPr/>
           <a:lstStyle/>
           <a:p>
-            <a:fld id="{DB851F3C-F00A-884D-AB2A-498327A1581F}" type="slidenum">
+            <a:fld id="{C1B45B73-84AC-FB49-8F2B-27810A872929}" type="slidenum">
               <a:rPr kumimoji="1" lang="zh-CN" altLang="en-US" smtClean="0"/>
               <a:t>‹#›</a:t>
             </a:fld>
@@ -2308,7 +2305,7 @@
     </p:spTree>
     <p:extLst>
       <p:ext uri="{BB962C8B-B14F-4D97-AF65-F5344CB8AC3E}">
-        <p14:creationId xmlns:p14="http://schemas.microsoft.com/office/powerpoint/2010/main" val="395033513"/>
+        <p14:creationId xmlns:p14="http://schemas.microsoft.com/office/powerpoint/2010/main" val="721960796"/>
       </p:ext>
     </p:extLst>
   </p:cSld>
@@ -2508,9 +2505,9 @@
           <a:bodyPr/>
           <a:lstStyle/>
           <a:p>
-            <a:fld id="{200C512D-3136-1144-BFF5-3CA45E2FA6FC}" type="datetimeFigureOut">
-              <a:rPr kumimoji="1" lang="zh-CN" altLang="en-US" smtClean="0"/>
-              <a:t>11/10/15</a:t>
+            <a:fld id="{2216C449-C998-D24C-B1B5-27E4F76912D7}" type="datetimeFigureOut">
+              <a:rPr kumimoji="1" lang="zh-CN" altLang="en-US" smtClean="0"/>
+              <a:t>11/18/15</a:t>
             </a:fld>
             <a:endParaRPr kumimoji="1" lang="zh-CN" altLang="en-US"/>
           </a:p>
@@ -2550,7 +2547,7 @@
           <a:bodyPr/>
           <a:lstStyle/>
           <a:p>
-            <a:fld id="{DB851F3C-F00A-884D-AB2A-498327A1581F}" type="slidenum">
+            <a:fld id="{C1B45B73-84AC-FB49-8F2B-27810A872929}" type="slidenum">
               <a:rPr kumimoji="1" lang="zh-CN" altLang="en-US" smtClean="0"/>
               <a:t>‹#›</a:t>
             </a:fld>
@@ -2561,7 +2558,7 @@
     </p:spTree>
     <p:extLst>
       <p:ext uri="{BB962C8B-B14F-4D97-AF65-F5344CB8AC3E}">
-        <p14:creationId xmlns:p14="http://schemas.microsoft.com/office/powerpoint/2010/main" val="1002913550"/>
+        <p14:creationId xmlns:p14="http://schemas.microsoft.com/office/powerpoint/2010/main" val="2180633214"/>
       </p:ext>
     </p:extLst>
   </p:cSld>
@@ -2721,9 +2718,9 @@
             </a:lvl1pPr>
           </a:lstStyle>
           <a:p>
-            <a:fld id="{200C512D-3136-1144-BFF5-3CA45E2FA6FC}" type="datetimeFigureOut">
-              <a:rPr kumimoji="1" lang="zh-CN" altLang="en-US" smtClean="0"/>
-              <a:t>11/10/15</a:t>
+            <a:fld id="{2216C449-C998-D24C-B1B5-27E4F76912D7}" type="datetimeFigureOut">
+              <a:rPr kumimoji="1" lang="zh-CN" altLang="en-US" smtClean="0"/>
+              <a:t>11/18/15</a:t>
             </a:fld>
             <a:endParaRPr kumimoji="1" lang="zh-CN" altLang="en-US"/>
           </a:p>
@@ -2799,7 +2796,7 @@
             </a:lvl1pPr>
           </a:lstStyle>
           <a:p>
-            <a:fld id="{DB851F3C-F00A-884D-AB2A-498327A1581F}" type="slidenum">
+            <a:fld id="{C1B45B73-84AC-FB49-8F2B-27810A872929}" type="slidenum">
               <a:rPr kumimoji="1" lang="zh-CN" altLang="en-US" smtClean="0"/>
               <a:t>‹#›</a:t>
             </a:fld>
@@ -2810,7 +2807,7 @@
     </p:spTree>
     <p:extLst>
       <p:ext uri="{BB962C8B-B14F-4D97-AF65-F5344CB8AC3E}">
-        <p14:creationId xmlns:p14="http://schemas.microsoft.com/office/powerpoint/2010/main" val="978136381"/>
+        <p14:creationId xmlns:p14="http://schemas.microsoft.com/office/powerpoint/2010/main" val="2494778585"/>
       </p:ext>
     </p:extLst>
   </p:cSld>
@@ -3100,365 +3097,168 @@
       </p:grpSpPr>
       <p:sp>
         <p:nvSpPr>
-          <p:cNvPr id="2" name="标题 1"/>
-          <p:cNvSpPr>
-            <a:spLocks noGrp="1"/>
-          </p:cNvSpPr>
-          <p:nvPr>
-            <p:ph type="title"/>
-          </p:nvPr>
-        </p:nvSpPr>
-        <p:spPr/>
+          <p:cNvPr id="6" name="标题 1"/>
+          <p:cNvSpPr>
+            <a:spLocks noGrp="1"/>
+          </p:cNvSpPr>
+          <p:nvPr>
+            <p:ph type="body" sz="half" idx="2"/>
+          </p:nvPr>
+        </p:nvSpPr>
+        <p:spPr>
+          <a:xfrm>
+            <a:off x="0" y="5387976"/>
+            <a:ext cx="9144000" cy="1470024"/>
+          </a:xfrm>
+        </p:spPr>
         <p:txBody>
           <a:bodyPr/>
           <a:lstStyle/>
           <a:p>
             <a:r>
               <a:rPr kumimoji="1" lang="en-US" altLang="zh-CN" smtClean="0"/>
-              <a:t>init</a:t>
-            </a:r>
-            <a:endParaRPr kumimoji="1" lang="zh-CN" altLang="en-US" dirty="0"/>
+              <a:t>Exp1:</a:t>
+            </a:r>
+          </a:p>
+          <a:p>
+            <a:r>
+              <a:rPr kumimoji="1" lang="zh-CN" altLang="zh-CN" smtClean="0"/>
+              <a:t>5</a:t>
+            </a:r>
+            <a:r>
+              <a:rPr kumimoji="1" lang="zh-CN" altLang="en-US" smtClean="0"/>
+              <a:t> </a:t>
+            </a:r>
+            <a:r>
+              <a:rPr kumimoji="1" lang="en-US" altLang="zh-CN" smtClean="0"/>
+              <a:t>aspect</a:t>
+            </a:r>
+            <a:r>
+              <a:rPr kumimoji="1" lang="zh-CN" altLang="en-US" smtClean="0"/>
+              <a:t> </a:t>
+            </a:r>
+            <a:r>
+              <a:rPr kumimoji="1" lang="en-US" altLang="zh-CN" smtClean="0"/>
+              <a:t>follow</a:t>
+            </a:r>
+            <a:r>
+              <a:rPr kumimoji="1" lang="zh-CN" altLang="en-US" smtClean="0"/>
+              <a:t> </a:t>
+            </a:r>
+            <a:r>
+              <a:rPr kumimoji="1" lang="en-US" altLang="zh-CN" smtClean="0"/>
+              <a:t>the</a:t>
+            </a:r>
+            <a:r>
+              <a:rPr kumimoji="1" lang="zh-CN" altLang="en-US" smtClean="0"/>
+              <a:t> </a:t>
+            </a:r>
+            <a:r>
+              <a:rPr kumimoji="1" lang="en-US" altLang="zh-CN" smtClean="0"/>
+              <a:t>same</a:t>
+            </a:r>
+            <a:r>
+              <a:rPr kumimoji="1" lang="zh-CN" altLang="en-US" smtClean="0"/>
+              <a:t> </a:t>
+            </a:r>
+            <a:r>
+              <a:rPr kumimoji="1" lang="en-US" altLang="zh-CN" smtClean="0"/>
+              <a:t>trend</a:t>
+            </a:r>
+          </a:p>
+          <a:p>
+            <a:r>
+              <a:rPr kumimoji="1" lang="en-US" altLang="zh-CN" smtClean="0"/>
+              <a:t>Trend is</a:t>
+            </a:r>
+            <a:r>
+              <a:rPr kumimoji="1" lang="zh-CN" altLang="en-US" smtClean="0"/>
+              <a:t> </a:t>
+            </a:r>
+            <a:r>
+              <a:rPr kumimoji="1" lang="en-US" altLang="zh-CN" smtClean="0"/>
+              <a:t>distribution</a:t>
+            </a:r>
+            <a:r>
+              <a:rPr kumimoji="1" lang="zh-CN" altLang="en-US" smtClean="0"/>
+              <a:t> </a:t>
+            </a:r>
+            <a:r>
+              <a:rPr kumimoji="1" lang="en-US" altLang="zh-CN" smtClean="0"/>
+              <a:t>of positive rating</a:t>
+            </a:r>
+            <a:r>
+              <a:rPr kumimoji="1" lang="zh-CN" altLang="en-US" smtClean="0"/>
+              <a:t> </a:t>
+            </a:r>
+            <a:r>
+              <a:rPr kumimoji="1" lang="en-US" altLang="zh-CN" smtClean="0"/>
+              <a:t>becoming</a:t>
+            </a:r>
+            <a:r>
+              <a:rPr kumimoji="1" lang="zh-CN" altLang="en-US" smtClean="0"/>
+              <a:t> </a:t>
+            </a:r>
+            <a:r>
+              <a:rPr kumimoji="1" lang="en-US" altLang="zh-CN" smtClean="0"/>
+              <a:t>less</a:t>
+            </a:r>
+            <a:r>
+              <a:rPr kumimoji="1" lang="zh-CN" altLang="en-US" smtClean="0"/>
+              <a:t> </a:t>
+            </a:r>
+            <a:r>
+              <a:rPr kumimoji="1" lang="en-US" altLang="zh-CN" smtClean="0"/>
+              <a:t>along</a:t>
+            </a:r>
+            <a:r>
+              <a:rPr kumimoji="1" lang="zh-CN" altLang="en-US" smtClean="0"/>
+              <a:t> </a:t>
+            </a:r>
+            <a:r>
+              <a:rPr kumimoji="1" lang="en-US" altLang="zh-CN" smtClean="0"/>
+              <a:t>with</a:t>
+            </a:r>
+            <a:r>
+              <a:rPr kumimoji="1" lang="zh-CN" altLang="en-US" smtClean="0"/>
+              <a:t> </a:t>
+            </a:r>
+            <a:r>
+              <a:rPr kumimoji="1" lang="en-US" altLang="zh-CN" smtClean="0"/>
+              <a:t>time</a:t>
+            </a:r>
+            <a:endParaRPr kumimoji="1" lang="en-US" altLang="zh-CN" dirty="0" smtClean="0"/>
           </a:p>
         </p:txBody>
       </p:sp>
       <p:pic>
         <p:nvPicPr>
-          <p:cNvPr id="8" name="内容占位符 7"/>
+          <p:cNvPr id="8" name="图片占位符 7"/>
           <p:cNvPicPr>
             <a:picLocks noGrp="1" noChangeAspect="1"/>
           </p:cNvPicPr>
           <p:nvPr>
-            <p:ph sz="half" idx="1"/>
+            <p:ph type="pic" idx="1"/>
           </p:nvPr>
         </p:nvPicPr>
         <p:blipFill>
           <a:blip r:embed="rId2"/>
-          <a:srcRect l="10722" r="10722"/>
+          <a:srcRect t="4213" b="4213"/>
           <a:stretch>
             <a:fillRect/>
           </a:stretch>
         </p:blipFill>
-        <p:spPr/>
-      </p:pic>
-      <p:pic>
-        <p:nvPicPr>
-          <p:cNvPr id="10" name="内容占位符 9"/>
-          <p:cNvPicPr>
-            <a:picLocks noGrp="1" noChangeAspect="1"/>
-          </p:cNvPicPr>
-          <p:nvPr>
-            <p:ph sz="half" idx="2"/>
-          </p:nvPr>
-        </p:nvPicPr>
-        <p:blipFill>
-          <a:blip r:embed="rId3"/>
-          <a:srcRect l="10722" r="10722"/>
-          <a:stretch>
-            <a:fillRect/>
-          </a:stretch>
-        </p:blipFill>
-        <p:spPr/>
+        <p:spPr>
+          <a:xfrm>
+            <a:off x="0" y="0"/>
+            <a:ext cx="9144000" cy="5387976"/>
+          </a:xfrm>
+        </p:spPr>
       </p:pic>
     </p:spTree>
     <p:extLst>
       <p:ext uri="{BB962C8B-B14F-4D97-AF65-F5344CB8AC3E}">
-        <p14:creationId xmlns:p14="http://schemas.microsoft.com/office/powerpoint/2010/main" val="4204096990"/>
-      </p:ext>
-    </p:extLst>
-  </p:cSld>
-  <p:clrMapOvr>
-    <a:masterClrMapping/>
-  </p:clrMapOvr>
-  <p:timing>
-    <p:tnLst>
-      <p:par>
-        <p:cTn xmlns:p14="http://schemas.microsoft.com/office/powerpoint/2010/main" id="1" dur="indefinite" restart="never" nodeType="tmRoot"/>
-      </p:par>
-    </p:tnLst>
-  </p:timing>
-</p:sld>
-</file>
-
-<file path=ppt/slides/slide2.xml><?xml version="1.0" encoding="utf-8"?>
-<p:sld xmlns:a="http://schemas.openxmlformats.org/drawingml/2006/main" xmlns:r="http://schemas.openxmlformats.org/officeDocument/2006/relationships" xmlns:p="http://schemas.openxmlformats.org/presentationml/2006/main">
-  <p:cSld>
-    <p:spTree>
-      <p:nvGrpSpPr>
-        <p:cNvPr id="1" name=""/>
-        <p:cNvGrpSpPr/>
-        <p:nvPr/>
-      </p:nvGrpSpPr>
-      <p:grpSpPr>
-        <a:xfrm>
-          <a:off x="0" y="0"/>
-          <a:ext cx="0" cy="0"/>
-          <a:chOff x="0" y="0"/>
-          <a:chExt cx="0" cy="0"/>
-        </a:xfrm>
-      </p:grpSpPr>
-      <p:sp>
-        <p:nvSpPr>
-          <p:cNvPr id="2" name="标题 1"/>
-          <p:cNvSpPr>
-            <a:spLocks noGrp="1"/>
-          </p:cNvSpPr>
-          <p:nvPr>
-            <p:ph type="title"/>
-          </p:nvPr>
-        </p:nvSpPr>
-        <p:spPr/>
-        <p:txBody>
-          <a:bodyPr/>
-          <a:lstStyle/>
-          <a:p>
-            <a:r>
-              <a:rPr kumimoji="1" lang="en-US" altLang="zh-CN" dirty="0" smtClean="0"/>
-              <a:t>Add</a:t>
-            </a:r>
-            <a:r>
-              <a:rPr kumimoji="1" lang="en-US" altLang="zh-CN" dirty="0" smtClean="0"/>
-              <a:t> 50 agreement to reviewer 1</a:t>
-            </a:r>
-            <a:endParaRPr kumimoji="1" lang="zh-CN" altLang="en-US" dirty="0"/>
-          </a:p>
-        </p:txBody>
-      </p:sp>
-      <p:pic>
-        <p:nvPicPr>
-          <p:cNvPr id="5" name="内容占位符 4"/>
-          <p:cNvPicPr>
-            <a:picLocks noGrp="1" noChangeAspect="1"/>
-          </p:cNvPicPr>
-          <p:nvPr>
-            <p:ph sz="half" idx="1"/>
-          </p:nvPr>
-        </p:nvPicPr>
-        <p:blipFill>
-          <a:blip r:embed="rId2"/>
-          <a:srcRect l="10722" r="10722"/>
-          <a:stretch>
-            <a:fillRect/>
-          </a:stretch>
-        </p:blipFill>
-        <p:spPr/>
-      </p:pic>
-      <p:pic>
-        <p:nvPicPr>
-          <p:cNvPr id="6" name="内容占位符 5"/>
-          <p:cNvPicPr>
-            <a:picLocks noGrp="1" noChangeAspect="1"/>
-          </p:cNvPicPr>
-          <p:nvPr>
-            <p:ph sz="half" idx="2"/>
-          </p:nvPr>
-        </p:nvPicPr>
-        <p:blipFill>
-          <a:blip r:embed="rId3"/>
-          <a:srcRect l="10722" r="10722"/>
-          <a:stretch>
-            <a:fillRect/>
-          </a:stretch>
-        </p:blipFill>
-        <p:spPr/>
-      </p:pic>
-    </p:spTree>
-    <p:extLst>
-      <p:ext uri="{BB962C8B-B14F-4D97-AF65-F5344CB8AC3E}">
-        <p14:creationId xmlns:p14="http://schemas.microsoft.com/office/powerpoint/2010/main" val="1884111091"/>
-      </p:ext>
-    </p:extLst>
-  </p:cSld>
-  <p:clrMapOvr>
-    <a:masterClrMapping/>
-  </p:clrMapOvr>
-</p:sld>
-</file>
-
-<file path=ppt/slides/slide3.xml><?xml version="1.0" encoding="utf-8"?>
-<p:sld xmlns:a="http://schemas.openxmlformats.org/drawingml/2006/main" xmlns:r="http://schemas.openxmlformats.org/officeDocument/2006/relationships" xmlns:p="http://schemas.openxmlformats.org/presentationml/2006/main">
-  <p:cSld>
-    <p:spTree>
-      <p:nvGrpSpPr>
-        <p:cNvPr id="1" name=""/>
-        <p:cNvGrpSpPr/>
-        <p:nvPr/>
-      </p:nvGrpSpPr>
-      <p:grpSpPr>
-        <a:xfrm>
-          <a:off x="0" y="0"/>
-          <a:ext cx="0" cy="0"/>
-          <a:chOff x="0" y="0"/>
-          <a:chExt cx="0" cy="0"/>
-        </a:xfrm>
-      </p:grpSpPr>
-      <p:sp>
-        <p:nvSpPr>
-          <p:cNvPr id="2" name="标题 1"/>
-          <p:cNvSpPr>
-            <a:spLocks noGrp="1"/>
-          </p:cNvSpPr>
-          <p:nvPr>
-            <p:ph type="title"/>
-          </p:nvPr>
-        </p:nvSpPr>
-        <p:spPr/>
-        <p:txBody>
-          <a:bodyPr>
-            <a:normAutofit fontScale="90000"/>
-          </a:bodyPr>
-          <a:lstStyle/>
-          <a:p>
-            <a:r>
-              <a:rPr kumimoji="1" lang="en-US" altLang="zh-CN" dirty="0" smtClean="0"/>
-              <a:t>Add</a:t>
-            </a:r>
-            <a:r>
-              <a:rPr kumimoji="1" lang="en-US" altLang="zh-CN" dirty="0" smtClean="0"/>
-              <a:t> 50% agreement with reviewer 1</a:t>
-            </a:r>
-            <a:endParaRPr kumimoji="1" lang="zh-CN" altLang="en-US" dirty="0"/>
-          </a:p>
-        </p:txBody>
-      </p:sp>
-      <p:pic>
-        <p:nvPicPr>
-          <p:cNvPr id="5" name="内容占位符 4"/>
-          <p:cNvPicPr>
-            <a:picLocks noGrp="1" noChangeAspect="1"/>
-          </p:cNvPicPr>
-          <p:nvPr>
-            <p:ph sz="half" idx="1"/>
-          </p:nvPr>
-        </p:nvPicPr>
-        <p:blipFill>
-          <a:blip r:embed="rId2"/>
-          <a:srcRect l="10722" r="10722"/>
-          <a:stretch>
-            <a:fillRect/>
-          </a:stretch>
-        </p:blipFill>
-        <p:spPr/>
-      </p:pic>
-      <p:pic>
-        <p:nvPicPr>
-          <p:cNvPr id="6" name="内容占位符 5"/>
-          <p:cNvPicPr>
-            <a:picLocks noGrp="1" noChangeAspect="1"/>
-          </p:cNvPicPr>
-          <p:nvPr>
-            <p:ph sz="half" idx="2"/>
-          </p:nvPr>
-        </p:nvPicPr>
-        <p:blipFill>
-          <a:blip r:embed="rId3"/>
-          <a:srcRect l="10722" r="10722"/>
-          <a:stretch>
-            <a:fillRect/>
-          </a:stretch>
-        </p:blipFill>
-        <p:spPr/>
-      </p:pic>
-    </p:spTree>
-    <p:extLst>
-      <p:ext uri="{BB962C8B-B14F-4D97-AF65-F5344CB8AC3E}">
-        <p14:creationId xmlns:p14="http://schemas.microsoft.com/office/powerpoint/2010/main" val="1755582246"/>
-      </p:ext>
-    </p:extLst>
-  </p:cSld>
-  <p:clrMapOvr>
-    <a:masterClrMapping/>
-  </p:clrMapOvr>
-</p:sld>
-</file>
-
-<file path=ppt/slides/slide4.xml><?xml version="1.0" encoding="utf-8"?>
-<p:sld xmlns:a="http://schemas.openxmlformats.org/drawingml/2006/main" xmlns:r="http://schemas.openxmlformats.org/officeDocument/2006/relationships" xmlns:p="http://schemas.openxmlformats.org/presentationml/2006/main">
-  <p:cSld>
-    <p:spTree>
-      <p:nvGrpSpPr>
-        <p:cNvPr id="1" name=""/>
-        <p:cNvGrpSpPr/>
-        <p:nvPr/>
-      </p:nvGrpSpPr>
-      <p:grpSpPr>
-        <a:xfrm>
-          <a:off x="0" y="0"/>
-          <a:ext cx="0" cy="0"/>
-          <a:chOff x="0" y="0"/>
-          <a:chExt cx="0" cy="0"/>
-        </a:xfrm>
-      </p:grpSpPr>
-      <p:sp>
-        <p:nvSpPr>
-          <p:cNvPr id="2" name="标题 1"/>
-          <p:cNvSpPr>
-            <a:spLocks noGrp="1"/>
-          </p:cNvSpPr>
-          <p:nvPr>
-            <p:ph type="title"/>
-          </p:nvPr>
-        </p:nvSpPr>
-        <p:spPr/>
-        <p:txBody>
-          <a:bodyPr>
-            <a:normAutofit fontScale="90000"/>
-          </a:bodyPr>
-          <a:lstStyle/>
-          <a:p>
-            <a:r>
-              <a:rPr kumimoji="1" lang="en-US" altLang="zh-CN" dirty="0" smtClean="0"/>
-              <a:t>Add</a:t>
-            </a:r>
-            <a:r>
-              <a:rPr kumimoji="1" lang="en-US" altLang="zh-CN" dirty="0" smtClean="0"/>
-              <a:t> 100 disagreement to reviewer 1</a:t>
-            </a:r>
-            <a:endParaRPr kumimoji="1" lang="zh-CN" altLang="en-US" dirty="0"/>
-          </a:p>
-        </p:txBody>
-      </p:sp>
-      <p:pic>
-        <p:nvPicPr>
-          <p:cNvPr id="5" name="内容占位符 4"/>
-          <p:cNvPicPr>
-            <a:picLocks noGrp="1" noChangeAspect="1"/>
-          </p:cNvPicPr>
-          <p:nvPr>
-            <p:ph sz="half" idx="1"/>
-          </p:nvPr>
-        </p:nvPicPr>
-        <p:blipFill>
-          <a:blip r:embed="rId2"/>
-          <a:srcRect l="10722" r="10722"/>
-          <a:stretch>
-            <a:fillRect/>
-          </a:stretch>
-        </p:blipFill>
-        <p:spPr/>
-      </p:pic>
-      <p:pic>
-        <p:nvPicPr>
-          <p:cNvPr id="6" name="内容占位符 5"/>
-          <p:cNvPicPr>
-            <a:picLocks noGrp="1" noChangeAspect="1"/>
-          </p:cNvPicPr>
-          <p:nvPr>
-            <p:ph sz="half" idx="2"/>
-          </p:nvPr>
-        </p:nvPicPr>
-        <p:blipFill>
-          <a:blip r:embed="rId3"/>
-          <a:srcRect l="10722" r="10722"/>
-          <a:stretch>
-            <a:fillRect/>
-          </a:stretch>
-        </p:blipFill>
-        <p:spPr/>
-      </p:pic>
-    </p:spTree>
-    <p:extLst>
-      <p:ext uri="{BB962C8B-B14F-4D97-AF65-F5344CB8AC3E}">
-        <p14:creationId xmlns:p14="http://schemas.microsoft.com/office/powerpoint/2010/main" val="2240331550"/>
+        <p14:creationId xmlns:p14="http://schemas.microsoft.com/office/powerpoint/2010/main" val="1227588773"/>
       </p:ext>
     </p:extLst>
   </p:cSld>

</xml_diff>